<commit_message>
added template design pattern code1
</commit_message>
<xml_diff>
--- a/FlightBookinSystem/bookingsystem.pptx
+++ b/FlightBookinSystem/bookingsystem.pptx
@@ -7,11 +7,12 @@
   <p:sldIdLst>
     <p:sldId id="256" r:id="rId2"/>
     <p:sldId id="259" r:id="rId3"/>
-    <p:sldId id="262" r:id="rId4"/>
-    <p:sldId id="261" r:id="rId5"/>
-    <p:sldId id="257" r:id="rId6"/>
-    <p:sldId id="260" r:id="rId7"/>
-    <p:sldId id="258" r:id="rId8"/>
+    <p:sldId id="263" r:id="rId4"/>
+    <p:sldId id="262" r:id="rId5"/>
+    <p:sldId id="261" r:id="rId6"/>
+    <p:sldId id="257" r:id="rId7"/>
+    <p:sldId id="260" r:id="rId8"/>
+    <p:sldId id="258" r:id="rId9"/>
   </p:sldIdLst>
   <p:sldSz cx="9144000" cy="6858000" type="screen4x3"/>
   <p:notesSz cx="6858000" cy="9144000"/>
@@ -294,7 +295,7 @@
           <a:p>
             <a:fld id="{1025B6A4-A27D-447C-B765-D5B9E4682750}" type="datetimeFigureOut">
               <a:rPr lang="en-US" smtClean="0"/>
-              <a:t>13/03/2018</a:t>
+              <a:t>14/03/2018</a:t>
             </a:fld>
             <a:endParaRPr lang="en-US"/>
           </a:p>
@@ -464,7 +465,7 @@
           <a:p>
             <a:fld id="{1025B6A4-A27D-447C-B765-D5B9E4682750}" type="datetimeFigureOut">
               <a:rPr lang="en-US" smtClean="0"/>
-              <a:t>13/03/2018</a:t>
+              <a:t>14/03/2018</a:t>
             </a:fld>
             <a:endParaRPr lang="en-US"/>
           </a:p>
@@ -644,7 +645,7 @@
           <a:p>
             <a:fld id="{1025B6A4-A27D-447C-B765-D5B9E4682750}" type="datetimeFigureOut">
               <a:rPr lang="en-US" smtClean="0"/>
-              <a:t>13/03/2018</a:t>
+              <a:t>14/03/2018</a:t>
             </a:fld>
             <a:endParaRPr lang="en-US"/>
           </a:p>
@@ -814,7 +815,7 @@
           <a:p>
             <a:fld id="{1025B6A4-A27D-447C-B765-D5B9E4682750}" type="datetimeFigureOut">
               <a:rPr lang="en-US" smtClean="0"/>
-              <a:t>13/03/2018</a:t>
+              <a:t>14/03/2018</a:t>
             </a:fld>
             <a:endParaRPr lang="en-US"/>
           </a:p>
@@ -1060,7 +1061,7 @@
           <a:p>
             <a:fld id="{1025B6A4-A27D-447C-B765-D5B9E4682750}" type="datetimeFigureOut">
               <a:rPr lang="en-US" smtClean="0"/>
-              <a:t>13/03/2018</a:t>
+              <a:t>14/03/2018</a:t>
             </a:fld>
             <a:endParaRPr lang="en-US"/>
           </a:p>
@@ -1348,7 +1349,7 @@
           <a:p>
             <a:fld id="{1025B6A4-A27D-447C-B765-D5B9E4682750}" type="datetimeFigureOut">
               <a:rPr lang="en-US" smtClean="0"/>
-              <a:t>13/03/2018</a:t>
+              <a:t>14/03/2018</a:t>
             </a:fld>
             <a:endParaRPr lang="en-US"/>
           </a:p>
@@ -1770,7 +1771,7 @@
           <a:p>
             <a:fld id="{1025B6A4-A27D-447C-B765-D5B9E4682750}" type="datetimeFigureOut">
               <a:rPr lang="en-US" smtClean="0"/>
-              <a:t>13/03/2018</a:t>
+              <a:t>14/03/2018</a:t>
             </a:fld>
             <a:endParaRPr lang="en-US"/>
           </a:p>
@@ -1888,7 +1889,7 @@
           <a:p>
             <a:fld id="{1025B6A4-A27D-447C-B765-D5B9E4682750}" type="datetimeFigureOut">
               <a:rPr lang="en-US" smtClean="0"/>
-              <a:t>13/03/2018</a:t>
+              <a:t>14/03/2018</a:t>
             </a:fld>
             <a:endParaRPr lang="en-US"/>
           </a:p>
@@ -1983,7 +1984,7 @@
           <a:p>
             <a:fld id="{1025B6A4-A27D-447C-B765-D5B9E4682750}" type="datetimeFigureOut">
               <a:rPr lang="en-US" smtClean="0"/>
-              <a:t>13/03/2018</a:t>
+              <a:t>14/03/2018</a:t>
             </a:fld>
             <a:endParaRPr lang="en-US"/>
           </a:p>
@@ -2260,7 +2261,7 @@
           <a:p>
             <a:fld id="{1025B6A4-A27D-447C-B765-D5B9E4682750}" type="datetimeFigureOut">
               <a:rPr lang="en-US" smtClean="0"/>
-              <a:t>13/03/2018</a:t>
+              <a:t>14/03/2018</a:t>
             </a:fld>
             <a:endParaRPr lang="en-US"/>
           </a:p>
@@ -2513,7 +2514,7 @@
           <a:p>
             <a:fld id="{1025B6A4-A27D-447C-B765-D5B9E4682750}" type="datetimeFigureOut">
               <a:rPr lang="en-US" smtClean="0"/>
-              <a:t>13/03/2018</a:t>
+              <a:t>14/03/2018</a:t>
             </a:fld>
             <a:endParaRPr lang="en-US"/>
           </a:p>
@@ -2726,7 +2727,7 @@
           <a:p>
             <a:fld id="{1025B6A4-A27D-447C-B765-D5B9E4682750}" type="datetimeFigureOut">
               <a:rPr lang="en-US" smtClean="0"/>
-              <a:t>13/03/2018</a:t>
+              <a:t>14/03/2018</a:t>
             </a:fld>
             <a:endParaRPr lang="en-US"/>
           </a:p>
@@ -3296,7 +3297,7 @@
           <p:spPr>
             <a:xfrm>
               <a:off x="4038600" y="2362200"/>
-              <a:ext cx="1219200" cy="381000"/>
+              <a:ext cx="1219200" cy="254100"/>
             </a:xfrm>
             <a:prstGeom prst="rect">
               <a:avLst/>
@@ -3310,10 +3311,10 @@
             <a:lstStyle/>
             <a:p>
               <a:r>
-                <a:rPr lang="en-US" dirty="0" smtClean="0"/>
+                <a:rPr lang="en-US" b="1" dirty="0" smtClean="0"/>
                 <a:t>Extends</a:t>
               </a:r>
-              <a:endParaRPr lang="en-US" dirty="0"/>
+              <a:endParaRPr lang="en-US" b="1" dirty="0"/>
             </a:p>
           </p:txBody>
         </p:sp>
@@ -3328,13 +3329,13 @@
   <p:clrMapOvr>
     <a:masterClrMapping/>
   </p:clrMapOvr>
-  <mc:AlternateContent xmlns:mc="http://schemas.openxmlformats.org/markup-compatibility/2006">
-    <mc:Choice xmlns:p14="http://schemas.microsoft.com/office/powerpoint/2010/main" Requires="p14">
+  <mc:AlternateContent xmlns:mc="http://schemas.openxmlformats.org/markup-compatibility/2006" xmlns:p14="http://schemas.microsoft.com/office/powerpoint/2010/main">
+    <mc:Choice Requires="p14">
       <p:transition spd="med" p14:dur="700">
         <p:fade/>
       </p:transition>
     </mc:Choice>
-    <mc:Fallback>
+    <mc:Fallback xmlns="">
       <p:transition spd="med">
         <p:fade/>
       </p:transition>
@@ -3562,7 +3563,7 @@
           <p:spPr>
             <a:xfrm>
               <a:off x="4038600" y="2362200"/>
-              <a:ext cx="1219200" cy="381000"/>
+              <a:ext cx="1219200" cy="273091"/>
             </a:xfrm>
             <a:prstGeom prst="rect">
               <a:avLst/>
@@ -3576,10 +3577,10 @@
             <a:lstStyle/>
             <a:p>
               <a:r>
-                <a:rPr lang="en-US" dirty="0" smtClean="0"/>
+                <a:rPr lang="en-US" sz="2000" b="1" dirty="0" smtClean="0"/>
                 <a:t>Extends</a:t>
               </a:r>
-              <a:endParaRPr lang="en-US" dirty="0"/>
+              <a:endParaRPr lang="en-US" sz="2000" b="1" dirty="0"/>
             </a:p>
           </p:txBody>
         </p:sp>
@@ -3722,7 +3723,7 @@
           <p:spPr>
             <a:xfrm>
               <a:off x="5301065" y="2365583"/>
-              <a:ext cx="1664368" cy="541114"/>
+              <a:ext cx="1664368" cy="400110"/>
             </a:xfrm>
             <a:prstGeom prst="rect">
               <a:avLst/>
@@ -3736,7 +3737,7 @@
             <a:lstStyle/>
             <a:p>
               <a:r>
-                <a:rPr lang="en-US" dirty="0" smtClean="0"/>
+                <a:rPr lang="en-US" sz="2000" b="1" dirty="0" smtClean="0"/>
                 <a:t>Extends</a:t>
               </a:r>
             </a:p>
@@ -3954,35 +3955,56 @@
         </p:nvSpPr>
         <p:spPr>
           <a:xfrm>
-            <a:off x="609600" y="2209800"/>
+            <a:off x="457200" y="2438400"/>
             <a:ext cx="8229600" cy="4525963"/>
           </a:xfrm>
         </p:spPr>
         <p:txBody>
-          <a:bodyPr>
-            <a:normAutofit/>
-          </a:bodyPr>
+          <a:bodyPr/>
           <a:lstStyle/>
           <a:p>
             <a:pPr marL="0" indent="0" algn="ctr">
               <a:buNone/>
             </a:pPr>
             <a:r>
-              <a:rPr lang="en-US" sz="6600" dirty="0" smtClean="0">
-                <a:latin typeface="Arial Black" pitchFamily="34" charset="0"/>
-              </a:rPr>
-              <a:t>LISKOV SUBSTITUTION</a:t>
-            </a:r>
-            <a:endParaRPr lang="en-US" sz="6600" dirty="0">
-              <a:latin typeface="Arial Black" pitchFamily="34" charset="0"/>
-            </a:endParaRPr>
+              <a:rPr lang="en-US" dirty="0" smtClean="0"/>
+              <a:t>If </a:t>
+            </a:r>
+            <a:r>
+              <a:rPr lang="en-US" dirty="0"/>
+              <a:t>S is a subtype of T, then objects of type T may be </a:t>
+            </a:r>
+            <a:r>
+              <a:rPr lang="en-US" i="1" dirty="0"/>
+              <a:t>replaced</a:t>
+            </a:r>
+            <a:r>
+              <a:rPr lang="en-US" dirty="0"/>
+              <a:t> with objects of type S </a:t>
+            </a:r>
+            <a:r>
+              <a:rPr lang="en-US" dirty="0" smtClean="0"/>
+              <a:t>without </a:t>
+            </a:r>
+            <a:r>
+              <a:rPr lang="en-US" dirty="0"/>
+              <a:t>altering any of the </a:t>
+            </a:r>
+            <a:r>
+              <a:rPr lang="en-US" dirty="0" smtClean="0"/>
+              <a:t>functioning of T.</a:t>
+            </a:r>
+            <a:r>
+              <a:rPr lang="en-US" dirty="0"/>
+              <a:t> </a:t>
+            </a:r>
           </a:p>
         </p:txBody>
       </p:sp>
     </p:spTree>
     <p:extLst>
       <p:ext uri="{BB962C8B-B14F-4D97-AF65-F5344CB8AC3E}">
-        <p14:creationId xmlns:p14="http://schemas.microsoft.com/office/powerpoint/2010/main" val="2288805623"/>
+        <p14:creationId xmlns:p14="http://schemas.microsoft.com/office/powerpoint/2010/main" val="3532508280"/>
       </p:ext>
     </p:extLst>
   </p:cSld>
@@ -3992,9 +4014,99 @@
   <p:timing>
     <p:tnLst>
       <p:par>
-        <p:cTn id="1" dur="indefinite" restart="never" nodeType="tmRoot"/>
+        <p:cTn id="1" dur="indefinite" restart="never" nodeType="tmRoot">
+          <p:childTnLst>
+            <p:seq concurrent="1" nextAc="seek">
+              <p:cTn id="2" dur="indefinite" nodeType="mainSeq">
+                <p:childTnLst>
+                  <p:par>
+                    <p:cTn id="3" fill="hold">
+                      <p:stCondLst>
+                        <p:cond delay="indefinite"/>
+                      </p:stCondLst>
+                      <p:childTnLst>
+                        <p:par>
+                          <p:cTn id="4" fill="hold">
+                            <p:stCondLst>
+                              <p:cond delay="0"/>
+                            </p:stCondLst>
+                            <p:childTnLst>
+                              <p:par>
+                                <p:cTn id="5" presetID="10" presetClass="entr" presetSubtype="0" fill="hold" grpId="0" nodeType="clickEffect">
+                                  <p:stCondLst>
+                                    <p:cond delay="0"/>
+                                  </p:stCondLst>
+                                  <p:iterate type="lt">
+                                    <p:tmPct val="10000"/>
+                                  </p:iterate>
+                                  <p:childTnLst>
+                                    <p:set>
+                                      <p:cBhvr>
+                                        <p:cTn id="6" dur="1" fill="hold">
+                                          <p:stCondLst>
+                                            <p:cond delay="0"/>
+                                          </p:stCondLst>
+                                        </p:cTn>
+                                        <p:tgtEl>
+                                          <p:spTgt spid="3">
+                                            <p:txEl>
+                                              <p:pRg st="0" end="0"/>
+                                            </p:txEl>
+                                          </p:spTgt>
+                                        </p:tgtEl>
+                                        <p:attrNameLst>
+                                          <p:attrName>style.visibility</p:attrName>
+                                        </p:attrNameLst>
+                                      </p:cBhvr>
+                                      <p:to>
+                                        <p:strVal val="visible"/>
+                                      </p:to>
+                                    </p:set>
+                                    <p:animEffect transition="in" filter="fade">
+                                      <p:cBhvr>
+                                        <p:cTn id="7" dur="500"/>
+                                        <p:tgtEl>
+                                          <p:spTgt spid="3">
+                                            <p:txEl>
+                                              <p:pRg st="0" end="0"/>
+                                            </p:txEl>
+                                          </p:spTgt>
+                                        </p:tgtEl>
+                                      </p:cBhvr>
+                                    </p:animEffect>
+                                  </p:childTnLst>
+                                </p:cTn>
+                              </p:par>
+                            </p:childTnLst>
+                          </p:cTn>
+                        </p:par>
+                      </p:childTnLst>
+                    </p:cTn>
+                  </p:par>
+                </p:childTnLst>
+              </p:cTn>
+              <p:prevCondLst>
+                <p:cond evt="onPrev" delay="0">
+                  <p:tgtEl>
+                    <p:sldTgt/>
+                  </p:tgtEl>
+                </p:cond>
+              </p:prevCondLst>
+              <p:nextCondLst>
+                <p:cond evt="onNext" delay="0">
+                  <p:tgtEl>
+                    <p:sldTgt/>
+                  </p:tgtEl>
+                </p:cond>
+              </p:nextCondLst>
+            </p:seq>
+          </p:childTnLst>
+        </p:cTn>
       </p:par>
     </p:tnLst>
+    <p:bldLst>
+      <p:bldP spid="3" grpId="0" build="p"/>
+    </p:bldLst>
   </p:timing>
 </p:sld>
 </file>
@@ -4028,6 +4140,80 @@
         </p:nvSpPr>
         <p:spPr>
           <a:xfrm>
+            <a:off x="609600" y="2209800"/>
+            <a:ext cx="8229600" cy="4525963"/>
+          </a:xfrm>
+        </p:spPr>
+        <p:txBody>
+          <a:bodyPr>
+            <a:normAutofit/>
+          </a:bodyPr>
+          <a:lstStyle/>
+          <a:p>
+            <a:pPr marL="0" indent="0" algn="ctr">
+              <a:buNone/>
+            </a:pPr>
+            <a:r>
+              <a:rPr lang="en-US" sz="6600" dirty="0" smtClean="0">
+                <a:latin typeface="Arial Black" pitchFamily="34" charset="0"/>
+              </a:rPr>
+              <a:t>LISKOV SUBSTITUTION</a:t>
+            </a:r>
+            <a:endParaRPr lang="en-US" sz="6600" dirty="0">
+              <a:latin typeface="Arial Black" pitchFamily="34" charset="0"/>
+            </a:endParaRPr>
+          </a:p>
+        </p:txBody>
+      </p:sp>
+    </p:spTree>
+    <p:extLst>
+      <p:ext uri="{BB962C8B-B14F-4D97-AF65-F5344CB8AC3E}">
+        <p14:creationId xmlns:p14="http://schemas.microsoft.com/office/powerpoint/2010/main" val="2288805623"/>
+      </p:ext>
+    </p:extLst>
+  </p:cSld>
+  <p:clrMapOvr>
+    <a:masterClrMapping/>
+  </p:clrMapOvr>
+  <p:timing>
+    <p:tnLst>
+      <p:par>
+        <p:cTn id="1" dur="indefinite" restart="never" nodeType="tmRoot"/>
+      </p:par>
+    </p:tnLst>
+  </p:timing>
+</p:sld>
+</file>
+
+<file path=ppt/slides/slide5.xml><?xml version="1.0" encoding="utf-8"?>
+<p:sld xmlns:a="http://schemas.openxmlformats.org/drawingml/2006/main" xmlns:r="http://schemas.openxmlformats.org/officeDocument/2006/relationships" xmlns:p="http://schemas.openxmlformats.org/presentationml/2006/main">
+  <p:cSld>
+    <p:spTree>
+      <p:nvGrpSpPr>
+        <p:cNvPr id="1" name=""/>
+        <p:cNvGrpSpPr/>
+        <p:nvPr/>
+      </p:nvGrpSpPr>
+      <p:grpSpPr>
+        <a:xfrm>
+          <a:off x="0" y="0"/>
+          <a:ext cx="0" cy="0"/>
+          <a:chOff x="0" y="0"/>
+          <a:chExt cx="0" cy="0"/>
+        </a:xfrm>
+      </p:grpSpPr>
+      <p:sp>
+        <p:nvSpPr>
+          <p:cNvPr id="3" name="Content Placeholder 2"/>
+          <p:cNvSpPr>
+            <a:spLocks noGrp="1"/>
+          </p:cNvSpPr>
+          <p:nvPr>
+            <p:ph idx="1"/>
+          </p:nvPr>
+        </p:nvSpPr>
+        <p:spPr>
+          <a:xfrm>
             <a:off x="990600" y="2514600"/>
             <a:ext cx="6781800" cy="2438400"/>
           </a:xfrm>
@@ -4069,7 +4255,7 @@
 </p:sld>
 </file>
 
-<file path=ppt/slides/slide5.xml><?xml version="1.0" encoding="utf-8"?>
+<file path=ppt/slides/slide6.xml><?xml version="1.0" encoding="utf-8"?>
 <p:sld xmlns:a="http://schemas.openxmlformats.org/drawingml/2006/main" xmlns:r="http://schemas.openxmlformats.org/officeDocument/2006/relationships" xmlns:p="http://schemas.openxmlformats.org/presentationml/2006/main">
   <p:cSld>
     <p:spTree>
@@ -4295,7 +4481,7 @@
             <p:spPr>
               <a:xfrm>
                 <a:off x="4038600" y="2362200"/>
-                <a:ext cx="1219200" cy="381000"/>
+                <a:ext cx="1219200" cy="400110"/>
               </a:xfrm>
               <a:prstGeom prst="rect">
                 <a:avLst/>
@@ -4309,10 +4495,10 @@
               <a:lstStyle/>
               <a:p>
                 <a:r>
-                  <a:rPr lang="en-US" dirty="0" smtClean="0"/>
+                  <a:rPr lang="en-US" sz="2000" b="1" dirty="0" smtClean="0"/>
                   <a:t>Extends</a:t>
                 </a:r>
-                <a:endParaRPr lang="en-US" dirty="0"/>
+                <a:endParaRPr lang="en-US" sz="2000" b="1" dirty="0"/>
               </a:p>
             </p:txBody>
           </p:sp>
@@ -4462,7 +4648,7 @@
           <p:spPr>
             <a:xfrm>
               <a:off x="2438400" y="2125579"/>
-              <a:ext cx="1143000" cy="369332"/>
+              <a:ext cx="1143000" cy="400110"/>
             </a:xfrm>
             <a:prstGeom prst="rect">
               <a:avLst/>
@@ -4476,7 +4662,7 @@
             <a:lstStyle/>
             <a:p>
               <a:r>
-                <a:rPr lang="en-US" dirty="0" smtClean="0"/>
+                <a:rPr lang="en-US" sz="2000" b="1" dirty="0" smtClean="0"/>
                 <a:t>Extends</a:t>
               </a:r>
             </a:p>
@@ -4506,7 +4692,7 @@
 </p:sld>
 </file>
 
-<file path=ppt/slides/slide6.xml><?xml version="1.0" encoding="utf-8"?>
+<file path=ppt/slides/slide7.xml><?xml version="1.0" encoding="utf-8"?>
 <p:sld xmlns:a="http://schemas.openxmlformats.org/drawingml/2006/main" xmlns:r="http://schemas.openxmlformats.org/officeDocument/2006/relationships" xmlns:p="http://schemas.openxmlformats.org/presentationml/2006/main">
   <p:cSld>
     <p:spTree>
@@ -4826,7 +5012,7 @@
             <p:spPr>
               <a:xfrm>
                 <a:off x="4038600" y="2362200"/>
-                <a:ext cx="1219200" cy="381000"/>
+                <a:ext cx="1219200" cy="400110"/>
               </a:xfrm>
               <a:prstGeom prst="rect">
                 <a:avLst/>
@@ -4840,10 +5026,10 @@
               <a:lstStyle/>
               <a:p>
                 <a:r>
-                  <a:rPr lang="en-US" dirty="0" smtClean="0"/>
+                  <a:rPr lang="en-US" sz="2000" b="1" dirty="0" smtClean="0"/>
                   <a:t>Extends</a:t>
                 </a:r>
-                <a:endParaRPr lang="en-US" dirty="0"/>
+                <a:endParaRPr lang="en-US" sz="2000" b="1" dirty="0"/>
               </a:p>
             </p:txBody>
           </p:sp>
@@ -4985,7 +5171,7 @@
           <p:spPr>
             <a:xfrm>
               <a:off x="7626927" y="1589262"/>
-              <a:ext cx="1143000" cy="369332"/>
+              <a:ext cx="1143000" cy="400110"/>
             </a:xfrm>
             <a:prstGeom prst="rect">
               <a:avLst/>
@@ -4999,7 +5185,7 @@
             <a:lstStyle/>
             <a:p>
               <a:r>
-                <a:rPr lang="en-US" dirty="0" smtClean="0"/>
+                <a:rPr lang="en-US" sz="2000" b="1" dirty="0" smtClean="0"/>
                 <a:t>Extends</a:t>
               </a:r>
             </a:p>
@@ -5047,7 +5233,7 @@
           <p:spPr>
             <a:xfrm>
               <a:off x="4260273" y="1610544"/>
-              <a:ext cx="1143000" cy="369332"/>
+              <a:ext cx="1143000" cy="400110"/>
             </a:xfrm>
             <a:prstGeom prst="rect">
               <a:avLst/>
@@ -5061,7 +5247,7 @@
             <a:lstStyle/>
             <a:p>
               <a:r>
-                <a:rPr lang="en-US" dirty="0" smtClean="0"/>
+                <a:rPr lang="en-US" sz="2000" b="1" dirty="0" smtClean="0"/>
                 <a:t>Extends</a:t>
               </a:r>
             </a:p>
@@ -5091,7 +5277,7 @@
 </p:sld>
 </file>
 
-<file path=ppt/slides/slide7.xml><?xml version="1.0" encoding="utf-8"?>
+<file path=ppt/slides/slide8.xml><?xml version="1.0" encoding="utf-8"?>
 <p:sld xmlns:a="http://schemas.openxmlformats.org/drawingml/2006/main" xmlns:r="http://schemas.openxmlformats.org/officeDocument/2006/relationships" xmlns:p="http://schemas.openxmlformats.org/presentationml/2006/main">
   <p:cSld>
     <p:spTree>
@@ -5414,7 +5600,7 @@
             <p:spPr>
               <a:xfrm>
                 <a:off x="2157847" y="3694800"/>
-                <a:ext cx="1219200" cy="381000"/>
+                <a:ext cx="1219200" cy="400110"/>
               </a:xfrm>
               <a:prstGeom prst="rect">
                 <a:avLst/>
@@ -5428,10 +5614,10 @@
               <a:lstStyle/>
               <a:p>
                 <a:r>
-                  <a:rPr lang="en-US" dirty="0" smtClean="0"/>
-                  <a:t>Extends</a:t>
+                  <a:rPr lang="en-US" sz="2000" b="1" dirty="0" smtClean="0"/>
+                  <a:t>Type2</a:t>
                 </a:r>
-                <a:endParaRPr lang="en-US" dirty="0"/>
+                <a:endParaRPr lang="en-US" sz="2000" b="1" dirty="0"/>
               </a:p>
             </p:txBody>
           </p:sp>
@@ -5578,7 +5764,7 @@
           <p:spPr>
             <a:xfrm>
               <a:off x="6293427" y="1277758"/>
-              <a:ext cx="1143000" cy="369332"/>
+              <a:ext cx="1143000" cy="400110"/>
             </a:xfrm>
             <a:prstGeom prst="rect">
               <a:avLst/>
@@ -5592,9 +5778,10 @@
             <a:lstStyle/>
             <a:p>
               <a:r>
-                <a:rPr lang="en-US" dirty="0" smtClean="0"/>
-                <a:t>Extends</a:t>
+                <a:rPr lang="en-US" sz="2000" b="1" dirty="0" smtClean="0"/>
+                <a:t>Type3</a:t>
               </a:r>
+              <a:endParaRPr lang="en-US" sz="2000" b="1" dirty="0" smtClean="0"/>
             </a:p>
           </p:txBody>
         </p:sp>
@@ -5640,7 +5827,7 @@
           <p:spPr>
             <a:xfrm>
               <a:off x="2254828" y="1354430"/>
-              <a:ext cx="1143000" cy="369332"/>
+              <a:ext cx="1143000" cy="400110"/>
             </a:xfrm>
             <a:prstGeom prst="rect">
               <a:avLst/>
@@ -5654,9 +5841,10 @@
             <a:lstStyle/>
             <a:p>
               <a:r>
-                <a:rPr lang="en-US" dirty="0" smtClean="0"/>
-                <a:t>Extends</a:t>
+                <a:rPr lang="en-US" sz="2000" b="1" dirty="0" smtClean="0"/>
+                <a:t>Type1</a:t>
               </a:r>
+              <a:endParaRPr lang="en-US" sz="2000" b="1" dirty="0" smtClean="0"/>
             </a:p>
           </p:txBody>
         </p:sp>

</xml_diff>